<commit_message>
Defining Procedure Class and tests, and Rename of Steps' Namespace.
</commit_message>
<xml_diff>
--- a/Docs/tep_drawings.pptx
+++ b/Docs/tep_drawings.pptx
@@ -263,7 +263,7 @@
           <a:p>
             <a:fld id="{166F7D50-0E95-4C6E-A896-B2F3F962F7B0}" type="datetimeFigureOut">
               <a:rPr lang="pt-BR" smtClean="0"/>
-              <a:t>15/05/2020</a:t>
+              <a:t>16/05/2020</a:t>
             </a:fld>
             <a:endParaRPr lang="pt-BR"/>
           </a:p>
@@ -461,7 +461,7 @@
           <a:p>
             <a:fld id="{166F7D50-0E95-4C6E-A896-B2F3F962F7B0}" type="datetimeFigureOut">
               <a:rPr lang="pt-BR" smtClean="0"/>
-              <a:t>15/05/2020</a:t>
+              <a:t>16/05/2020</a:t>
             </a:fld>
             <a:endParaRPr lang="pt-BR"/>
           </a:p>
@@ -669,7 +669,7 @@
           <a:p>
             <a:fld id="{166F7D50-0E95-4C6E-A896-B2F3F962F7B0}" type="datetimeFigureOut">
               <a:rPr lang="pt-BR" smtClean="0"/>
-              <a:t>15/05/2020</a:t>
+              <a:t>16/05/2020</a:t>
             </a:fld>
             <a:endParaRPr lang="pt-BR"/>
           </a:p>
@@ -867,7 +867,7 @@
           <a:p>
             <a:fld id="{166F7D50-0E95-4C6E-A896-B2F3F962F7B0}" type="datetimeFigureOut">
               <a:rPr lang="pt-BR" smtClean="0"/>
-              <a:t>15/05/2020</a:t>
+              <a:t>16/05/2020</a:t>
             </a:fld>
             <a:endParaRPr lang="pt-BR"/>
           </a:p>
@@ -1142,7 +1142,7 @@
           <a:p>
             <a:fld id="{166F7D50-0E95-4C6E-A896-B2F3F962F7B0}" type="datetimeFigureOut">
               <a:rPr lang="pt-BR" smtClean="0"/>
-              <a:t>15/05/2020</a:t>
+              <a:t>16/05/2020</a:t>
             </a:fld>
             <a:endParaRPr lang="pt-BR"/>
           </a:p>
@@ -1407,7 +1407,7 @@
           <a:p>
             <a:fld id="{166F7D50-0E95-4C6E-A896-B2F3F962F7B0}" type="datetimeFigureOut">
               <a:rPr lang="pt-BR" smtClean="0"/>
-              <a:t>15/05/2020</a:t>
+              <a:t>16/05/2020</a:t>
             </a:fld>
             <a:endParaRPr lang="pt-BR"/>
           </a:p>
@@ -1819,7 +1819,7 @@
           <a:p>
             <a:fld id="{166F7D50-0E95-4C6E-A896-B2F3F962F7B0}" type="datetimeFigureOut">
               <a:rPr lang="pt-BR" smtClean="0"/>
-              <a:t>15/05/2020</a:t>
+              <a:t>16/05/2020</a:t>
             </a:fld>
             <a:endParaRPr lang="pt-BR"/>
           </a:p>
@@ -1960,7 +1960,7 @@
           <a:p>
             <a:fld id="{166F7D50-0E95-4C6E-A896-B2F3F962F7B0}" type="datetimeFigureOut">
               <a:rPr lang="pt-BR" smtClean="0"/>
-              <a:t>15/05/2020</a:t>
+              <a:t>16/05/2020</a:t>
             </a:fld>
             <a:endParaRPr lang="pt-BR"/>
           </a:p>
@@ -2073,7 +2073,7 @@
           <a:p>
             <a:fld id="{166F7D50-0E95-4C6E-A896-B2F3F962F7B0}" type="datetimeFigureOut">
               <a:rPr lang="pt-BR" smtClean="0"/>
-              <a:t>15/05/2020</a:t>
+              <a:t>16/05/2020</a:t>
             </a:fld>
             <a:endParaRPr lang="pt-BR"/>
           </a:p>
@@ -2384,7 +2384,7 @@
           <a:p>
             <a:fld id="{166F7D50-0E95-4C6E-A896-B2F3F962F7B0}" type="datetimeFigureOut">
               <a:rPr lang="pt-BR" smtClean="0"/>
-              <a:t>15/05/2020</a:t>
+              <a:t>16/05/2020</a:t>
             </a:fld>
             <a:endParaRPr lang="pt-BR"/>
           </a:p>
@@ -2672,7 +2672,7 @@
           <a:p>
             <a:fld id="{166F7D50-0E95-4C6E-A896-B2F3F962F7B0}" type="datetimeFigureOut">
               <a:rPr lang="pt-BR" smtClean="0"/>
-              <a:t>15/05/2020</a:t>
+              <a:t>16/05/2020</a:t>
             </a:fld>
             <a:endParaRPr lang="pt-BR"/>
           </a:p>
@@ -2913,7 +2913,7 @@
           <a:p>
             <a:fld id="{166F7D50-0E95-4C6E-A896-B2F3F962F7B0}" type="datetimeFigureOut">
               <a:rPr lang="pt-BR" smtClean="0"/>
-              <a:t>15/05/2020</a:t>
+              <a:t>16/05/2020</a:t>
             </a:fld>
             <a:endParaRPr lang="pt-BR"/>
           </a:p>

</xml_diff>